<commit_message>
menambahkan tkinter GUI, finishing mydash.py, menambahkan file png
</commit_message>
<xml_diff>
--- a/slidemstr.pptx
+++ b/slidemstr.pptx
@@ -194,7 +194,7 @@
           <a:p>
             <a:fld id="{FF4AF885-0C11-1C41-A882-4ADD5733D7CB}" type="datetimeFigureOut">
               <a:rPr lang="en-US" smtClean="0"/>
-              <a:t>4/20/2022</a:t>
+              <a:t>6/23/2022</a:t>
             </a:fld>
             <a:endParaRPr lang="en-US"/>
           </a:p>
@@ -879,7 +879,7 @@
           <a:p>
             <a:fld id="{20B981A6-B2BD-294E-991E-51356C712A28}" type="datetimeFigureOut">
               <a:rPr lang="en-US" smtClean="0"/>
-              <a:t>4/20/2022</a:t>
+              <a:t>6/23/2022</a:t>
             </a:fld>
             <a:endParaRPr lang="en-US"/>
           </a:p>
@@ -20104,7 +20104,7 @@
           <a:p>
             <a:fld id="{20B981A6-B2BD-294E-991E-51356C712A28}" type="datetimeFigureOut">
               <a:rPr lang="en-US" smtClean="0"/>
-              <a:t>4/20/2022</a:t>
+              <a:t>6/23/2022</a:t>
             </a:fld>
             <a:endParaRPr lang="en-US"/>
           </a:p>
@@ -21093,7 +21093,7 @@
           </a:ln>
           <a:extLst>
             <a:ext uri="{909E8E84-426E-40dd-AFC4-6F175D3DCCD1}">
-              <a14:hiddenFill xmlns="" xmlns:a14="http://schemas.microsoft.com/office/drawing/2010/main">
+              <a14:hiddenFill xmlns:a14="http://schemas.microsoft.com/office/drawing/2010/main" xmlns="">
                 <a:solidFill>
                   <a:srgbClr val="FFFFFF">
                     <a:lumMod val="100000"/>
@@ -33493,42 +33493,42 @@
 <file path=ppt/theme/theme1.xml><?xml version="1.0" encoding="utf-8"?>
 <a:theme xmlns:a="http://schemas.openxmlformats.org/drawingml/2006/main" name="telkom">
   <a:themeElements>
-    <a:clrScheme name="PT Telkom_16.9 191111">
+    <a:clrScheme name="Custom 3">
       <a:dk1>
-        <a:srgbClr val="000000"/>
+        <a:sysClr val="windowText" lastClr="000000"/>
       </a:dk1>
       <a:lt1>
-        <a:srgbClr val="FFFFFF"/>
+        <a:sysClr val="window" lastClr="FFFFFF"/>
       </a:lt1>
       <a:dk2>
-        <a:srgbClr val="D6D6D6"/>
+        <a:srgbClr val="44546A"/>
       </a:dk2>
       <a:lt2>
-        <a:srgbClr val="5C5C5C"/>
+        <a:srgbClr val="E7E6E6"/>
       </a:lt2>
       <a:accent1>
-        <a:srgbClr val="B4B4B4"/>
+        <a:srgbClr val="7030A0"/>
       </a:accent1>
       <a:accent2>
-        <a:srgbClr val="D6D6D6"/>
+        <a:srgbClr val="48A1FA"/>
       </a:accent2>
       <a:accent3>
-        <a:srgbClr val="DC365B"/>
+        <a:srgbClr val="70AD47"/>
       </a:accent3>
       <a:accent4>
-        <a:srgbClr val="46647B"/>
+        <a:srgbClr val="FF0000"/>
       </a:accent4>
       <a:accent5>
-        <a:srgbClr val="507867"/>
+        <a:srgbClr val="FECF3F"/>
       </a:accent5>
       <a:accent6>
-        <a:srgbClr val="8E806F"/>
+        <a:srgbClr val="FFFFCC"/>
       </a:accent6>
       <a:hlink>
-        <a:srgbClr val="46647B"/>
+        <a:srgbClr val="0563C1"/>
       </a:hlink>
       <a:folHlink>
-        <a:srgbClr val="7891AA"/>
+        <a:srgbClr val="954F72"/>
       </a:folHlink>
     </a:clrScheme>
     <a:fontScheme name="Arial">

</xml_diff>